<commit_message>
Neue Lightmap, damit Notiz wieder lesbar ist. Neue Texturen für Notizen. Mehr Notizen hinzugefügt. Name von Ölampulle hinzugefügt
</commit_message>
<xml_diff>
--- a/ProjectFactory_Slide.pptx
+++ b/ProjectFactory_Slide.pptx
@@ -259,7 +259,7 @@
           <a:p>
             <a:fld id="{4E5306ED-3066-4C45-BD6B-2FF185E12B52}" type="datetimeFigureOut">
               <a:rPr lang="de-DE" smtClean="0"/>
-              <a:t>06.07.2019</a:t>
+              <a:t>07.07.2019</a:t>
             </a:fld>
             <a:endParaRPr lang="de-DE"/>
           </a:p>
@@ -457,7 +457,7 @@
           <a:p>
             <a:fld id="{4E5306ED-3066-4C45-BD6B-2FF185E12B52}" type="datetimeFigureOut">
               <a:rPr lang="de-DE" smtClean="0"/>
-              <a:t>06.07.2019</a:t>
+              <a:t>07.07.2019</a:t>
             </a:fld>
             <a:endParaRPr lang="de-DE"/>
           </a:p>
@@ -665,7 +665,7 @@
           <a:p>
             <a:fld id="{4E5306ED-3066-4C45-BD6B-2FF185E12B52}" type="datetimeFigureOut">
               <a:rPr lang="de-DE" smtClean="0"/>
-              <a:t>06.07.2019</a:t>
+              <a:t>07.07.2019</a:t>
             </a:fld>
             <a:endParaRPr lang="de-DE"/>
           </a:p>
@@ -863,7 +863,7 @@
           <a:p>
             <a:fld id="{4E5306ED-3066-4C45-BD6B-2FF185E12B52}" type="datetimeFigureOut">
               <a:rPr lang="de-DE" smtClean="0"/>
-              <a:t>06.07.2019</a:t>
+              <a:t>07.07.2019</a:t>
             </a:fld>
             <a:endParaRPr lang="de-DE"/>
           </a:p>
@@ -1138,7 +1138,7 @@
           <a:p>
             <a:fld id="{4E5306ED-3066-4C45-BD6B-2FF185E12B52}" type="datetimeFigureOut">
               <a:rPr lang="de-DE" smtClean="0"/>
-              <a:t>06.07.2019</a:t>
+              <a:t>07.07.2019</a:t>
             </a:fld>
             <a:endParaRPr lang="de-DE"/>
           </a:p>
@@ -1403,7 +1403,7 @@
           <a:p>
             <a:fld id="{4E5306ED-3066-4C45-BD6B-2FF185E12B52}" type="datetimeFigureOut">
               <a:rPr lang="de-DE" smtClean="0"/>
-              <a:t>06.07.2019</a:t>
+              <a:t>07.07.2019</a:t>
             </a:fld>
             <a:endParaRPr lang="de-DE"/>
           </a:p>
@@ -1815,7 +1815,7 @@
           <a:p>
             <a:fld id="{4E5306ED-3066-4C45-BD6B-2FF185E12B52}" type="datetimeFigureOut">
               <a:rPr lang="de-DE" smtClean="0"/>
-              <a:t>06.07.2019</a:t>
+              <a:t>07.07.2019</a:t>
             </a:fld>
             <a:endParaRPr lang="de-DE"/>
           </a:p>
@@ -1956,7 +1956,7 @@
           <a:p>
             <a:fld id="{4E5306ED-3066-4C45-BD6B-2FF185E12B52}" type="datetimeFigureOut">
               <a:rPr lang="de-DE" smtClean="0"/>
-              <a:t>06.07.2019</a:t>
+              <a:t>07.07.2019</a:t>
             </a:fld>
             <a:endParaRPr lang="de-DE"/>
           </a:p>
@@ -2069,7 +2069,7 @@
           <a:p>
             <a:fld id="{4E5306ED-3066-4C45-BD6B-2FF185E12B52}" type="datetimeFigureOut">
               <a:rPr lang="de-DE" smtClean="0"/>
-              <a:t>06.07.2019</a:t>
+              <a:t>07.07.2019</a:t>
             </a:fld>
             <a:endParaRPr lang="de-DE"/>
           </a:p>
@@ -2380,7 +2380,7 @@
           <a:p>
             <a:fld id="{4E5306ED-3066-4C45-BD6B-2FF185E12B52}" type="datetimeFigureOut">
               <a:rPr lang="de-DE" smtClean="0"/>
-              <a:t>06.07.2019</a:t>
+              <a:t>07.07.2019</a:t>
             </a:fld>
             <a:endParaRPr lang="de-DE"/>
           </a:p>
@@ -2668,7 +2668,7 @@
           <a:p>
             <a:fld id="{4E5306ED-3066-4C45-BD6B-2FF185E12B52}" type="datetimeFigureOut">
               <a:rPr lang="de-DE" smtClean="0"/>
-              <a:t>06.07.2019</a:t>
+              <a:t>07.07.2019</a:t>
             </a:fld>
             <a:endParaRPr lang="de-DE"/>
           </a:p>
@@ -2909,7 +2909,7 @@
           <a:p>
             <a:fld id="{4E5306ED-3066-4C45-BD6B-2FF185E12B52}" type="datetimeFigureOut">
               <a:rPr lang="de-DE" smtClean="0"/>
-              <a:t>06.07.2019</a:t>
+              <a:t>07.07.2019</a:t>
             </a:fld>
             <a:endParaRPr lang="de-DE"/>
           </a:p>
@@ -3373,12 +3373,8 @@
               <a:buNone/>
             </a:pPr>
             <a:r>
-              <a:rPr lang="de-DE"/>
-              <a:t>Ein Adventurespiel </a:t>
-            </a:r>
-            <a:r>
               <a:rPr lang="de-DE" dirty="0"/>
-              <a:t>im Horror-Survival Genre nach dem „Escape </a:t>
+              <a:t>Ein Adventurespiel im Horror-Survival Genre nach dem „Escape </a:t>
             </a:r>
             <a:r>
               <a:rPr lang="de-DE" dirty="0" err="1"/>

</xml_diff>